<commit_message>
jours 4 - fin de matinee
</commit_message>
<xml_diff>
--- a/regression_prix_des_maisons_a_boston.pptx
+++ b/regression_prix_des_maisons_a_boston.pptx
@@ -7,6 +7,8 @@
   <p:sldIdLst>
     <p:sldId id="256" r:id="rId2"/>
     <p:sldId id="257" r:id="rId3"/>
+    <p:sldId id="258" r:id="rId4"/>
+    <p:sldId id="259" r:id="rId5"/>
   </p:sldIdLst>
   <p:sldSz cx="12192000" cy="6858000"/>
   <p:notesSz cx="6858000" cy="9144000"/>
@@ -3589,6 +3591,659 @@
 </p:sld>
 </file>
 
+<file path=ppt/slides/slide3.xml><?xml version="1.0" encoding="utf-8"?>
+<p:sld xmlns:a="http://schemas.openxmlformats.org/drawingml/2006/main" xmlns:r="http://schemas.openxmlformats.org/officeDocument/2006/relationships" xmlns:p="http://schemas.openxmlformats.org/presentationml/2006/main">
+  <p:cSld>
+    <p:spTree>
+      <p:nvGrpSpPr>
+        <p:cNvPr id="1" name=""/>
+        <p:cNvGrpSpPr/>
+        <p:nvPr/>
+      </p:nvGrpSpPr>
+      <p:grpSpPr>
+        <a:xfrm>
+          <a:off x="0" y="0"/>
+          <a:ext cx="0" cy="0"/>
+          <a:chOff x="0" y="0"/>
+          <a:chExt cx="0" cy="0"/>
+        </a:xfrm>
+      </p:grpSpPr>
+      <p:sp>
+        <p:nvSpPr>
+          <p:cNvPr id="2" name="Titre 1">
+            <a:extLst>
+              <a:ext uri="{FF2B5EF4-FFF2-40B4-BE49-F238E27FC236}">
+                <a16:creationId xmlns:a16="http://schemas.microsoft.com/office/drawing/2014/main" id="{A480EA00-679F-354E-AA31-EA0AC8BA5F4C}"/>
+              </a:ext>
+            </a:extLst>
+          </p:cNvPr>
+          <p:cNvSpPr>
+            <a:spLocks noGrp="1"/>
+          </p:cNvSpPr>
+          <p:nvPr>
+            <p:ph type="title"/>
+          </p:nvPr>
+        </p:nvSpPr>
+        <p:spPr/>
+        <p:txBody>
+          <a:bodyPr/>
+          <a:lstStyle/>
+          <a:p>
+            <a:endParaRPr lang="fr-FR"/>
+          </a:p>
+        </p:txBody>
+      </p:sp>
+      <p:sp>
+        <p:nvSpPr>
+          <p:cNvPr id="3" name="Espace réservé du contenu 2">
+            <a:extLst>
+              <a:ext uri="{FF2B5EF4-FFF2-40B4-BE49-F238E27FC236}">
+                <a16:creationId xmlns:a16="http://schemas.microsoft.com/office/drawing/2014/main" id="{8BB8B817-68C6-E24C-9C50-0AF5D24C95AC}"/>
+              </a:ext>
+            </a:extLst>
+          </p:cNvPr>
+          <p:cNvSpPr>
+            <a:spLocks noGrp="1"/>
+          </p:cNvSpPr>
+          <p:nvPr>
+            <p:ph idx="1"/>
+          </p:nvPr>
+        </p:nvSpPr>
+        <p:spPr/>
+        <p:txBody>
+          <a:bodyPr/>
+          <a:lstStyle/>
+          <a:p>
+            <a:endParaRPr lang="fr-FR"/>
+          </a:p>
+        </p:txBody>
+      </p:sp>
+      <p:pic>
+        <p:nvPicPr>
+          <p:cNvPr id="4" name="Image 3">
+            <a:extLst>
+              <a:ext uri="{FF2B5EF4-FFF2-40B4-BE49-F238E27FC236}">
+                <a16:creationId xmlns:a16="http://schemas.microsoft.com/office/drawing/2014/main" id="{A3390D11-0510-4143-83B1-808F29BE432E}"/>
+              </a:ext>
+            </a:extLst>
+          </p:cNvPr>
+          <p:cNvPicPr>
+            <a:picLocks noChangeAspect="1"/>
+          </p:cNvPicPr>
+          <p:nvPr/>
+        </p:nvPicPr>
+        <p:blipFill>
+          <a:blip r:embed="rId2"/>
+          <a:stretch>
+            <a:fillRect/>
+          </a:stretch>
+        </p:blipFill>
+        <p:spPr>
+          <a:xfrm>
+            <a:off x="673100" y="228600"/>
+            <a:ext cx="10845800" cy="6400800"/>
+          </a:xfrm>
+          <a:prstGeom prst="rect">
+            <a:avLst/>
+          </a:prstGeom>
+        </p:spPr>
+      </p:pic>
+    </p:spTree>
+    <p:extLst>
+      <p:ext uri="{BB962C8B-B14F-4D97-AF65-F5344CB8AC3E}">
+        <p14:creationId xmlns:p14="http://schemas.microsoft.com/office/powerpoint/2010/main" val="77927075"/>
+      </p:ext>
+    </p:extLst>
+  </p:cSld>
+  <p:clrMapOvr>
+    <a:masterClrMapping/>
+  </p:clrMapOvr>
+</p:sld>
+</file>
+
+<file path=ppt/slides/slide4.xml><?xml version="1.0" encoding="utf-8"?>
+<p:sld xmlns:a="http://schemas.openxmlformats.org/drawingml/2006/main" xmlns:r="http://schemas.openxmlformats.org/officeDocument/2006/relationships" xmlns:p="http://schemas.openxmlformats.org/presentationml/2006/main">
+  <p:cSld>
+    <p:spTree>
+      <p:nvGrpSpPr>
+        <p:cNvPr id="1" name=""/>
+        <p:cNvGrpSpPr/>
+        <p:nvPr/>
+      </p:nvGrpSpPr>
+      <p:grpSpPr>
+        <a:xfrm>
+          <a:off x="0" y="0"/>
+          <a:ext cx="0" cy="0"/>
+          <a:chOff x="0" y="0"/>
+          <a:chExt cx="0" cy="0"/>
+        </a:xfrm>
+      </p:grpSpPr>
+      <p:pic>
+        <p:nvPicPr>
+          <p:cNvPr id="4" name="Image 3">
+            <a:extLst>
+              <a:ext uri="{FF2B5EF4-FFF2-40B4-BE49-F238E27FC236}">
+                <a16:creationId xmlns:a16="http://schemas.microsoft.com/office/drawing/2014/main" id="{F057C82A-D663-C140-B885-06ECF71C69D7}"/>
+              </a:ext>
+            </a:extLst>
+          </p:cNvPr>
+          <p:cNvPicPr>
+            <a:picLocks noChangeAspect="1"/>
+          </p:cNvPicPr>
+          <p:nvPr/>
+        </p:nvPicPr>
+        <p:blipFill>
+          <a:blip r:embed="rId2"/>
+          <a:stretch>
+            <a:fillRect/>
+          </a:stretch>
+        </p:blipFill>
+        <p:spPr>
+          <a:xfrm>
+            <a:off x="438611" y="0"/>
+            <a:ext cx="6818081" cy="6858000"/>
+          </a:xfrm>
+          <a:prstGeom prst="rect">
+            <a:avLst/>
+          </a:prstGeom>
+        </p:spPr>
+      </p:pic>
+      <p:sp>
+        <p:nvSpPr>
+          <p:cNvPr id="5" name="Rectangle 4">
+            <a:extLst>
+              <a:ext uri="{FF2B5EF4-FFF2-40B4-BE49-F238E27FC236}">
+                <a16:creationId xmlns:a16="http://schemas.microsoft.com/office/drawing/2014/main" id="{B833879F-10B4-4846-9FDD-B2153E25D081}"/>
+              </a:ext>
+            </a:extLst>
+          </p:cNvPr>
+          <p:cNvSpPr/>
+          <p:nvPr/>
+        </p:nvSpPr>
+        <p:spPr>
+          <a:xfrm>
+            <a:off x="7444292" y="365125"/>
+            <a:ext cx="4572000" cy="1938992"/>
+          </a:xfrm>
+          <a:prstGeom prst="rect">
+            <a:avLst/>
+          </a:prstGeom>
+        </p:spPr>
+        <p:txBody>
+          <a:bodyPr wrap="square">
+            <a:spAutoFit/>
+          </a:bodyPr>
+          <a:lstStyle/>
+          <a:p>
+            <a:r>
+              <a:rPr lang="fr-FR" sz="800" dirty="0" err="1"/>
+              <a:t>signification_des_colonnes</a:t>
+            </a:r>
+            <a:r>
+              <a:rPr lang="fr-FR" sz="800" dirty="0"/>
+              <a:t> = {</a:t>
+            </a:r>
+          </a:p>
+          <a:p>
+            <a:r>
+              <a:rPr lang="fr-FR" sz="800" dirty="0"/>
+              <a:t>    "CRIM"     : "per capita crime rate by </a:t>
+            </a:r>
+            <a:r>
+              <a:rPr lang="fr-FR" sz="800" dirty="0" err="1"/>
+              <a:t>town</a:t>
+            </a:r>
+            <a:r>
+              <a:rPr lang="fr-FR" sz="800" dirty="0"/>
+              <a:t>",</a:t>
+            </a:r>
+          </a:p>
+          <a:p>
+            <a:r>
+              <a:rPr lang="fr-FR" sz="800" dirty="0"/>
+              <a:t>    "ZN"       : "proportion of </a:t>
+            </a:r>
+            <a:r>
+              <a:rPr lang="fr-FR" sz="800" dirty="0" err="1"/>
+              <a:t>residential</a:t>
+            </a:r>
+            <a:r>
+              <a:rPr lang="fr-FR" sz="800" dirty="0"/>
+              <a:t> land </a:t>
+            </a:r>
+            <a:r>
+              <a:rPr lang="fr-FR" sz="800" dirty="0" err="1"/>
+              <a:t>zoned</a:t>
+            </a:r>
+            <a:r>
+              <a:rPr lang="fr-FR" sz="800" dirty="0"/>
+              <a:t> for lots over 25,000 </a:t>
+            </a:r>
+            <a:r>
+              <a:rPr lang="fr-FR" sz="800" dirty="0" err="1"/>
+              <a:t>sq.ft</a:t>
+            </a:r>
+            <a:r>
+              <a:rPr lang="fr-FR" sz="800" dirty="0"/>
+              <a:t>.",</a:t>
+            </a:r>
+          </a:p>
+          <a:p>
+            <a:r>
+              <a:rPr lang="fr-FR" sz="800" dirty="0"/>
+              <a:t>    "INDUS"    : "proportion of non-</a:t>
+            </a:r>
+            <a:r>
+              <a:rPr lang="fr-FR" sz="800" dirty="0" err="1"/>
+              <a:t>retail</a:t>
+            </a:r>
+            <a:r>
+              <a:rPr lang="fr-FR" sz="800" dirty="0"/>
+              <a:t> business acres per </a:t>
+            </a:r>
+            <a:r>
+              <a:rPr lang="fr-FR" sz="800" dirty="0" err="1"/>
+              <a:t>town</a:t>
+            </a:r>
+            <a:r>
+              <a:rPr lang="fr-FR" sz="800" dirty="0"/>
+              <a:t>",</a:t>
+            </a:r>
+          </a:p>
+          <a:p>
+            <a:r>
+              <a:rPr lang="fr-FR" sz="800" dirty="0"/>
+              <a:t>    "CHAS"     : "Charles River </a:t>
+            </a:r>
+            <a:r>
+              <a:rPr lang="fr-FR" sz="800" dirty="0" err="1"/>
+              <a:t>dummy</a:t>
+            </a:r>
+            <a:r>
+              <a:rPr lang="fr-FR" sz="800" dirty="0"/>
+              <a:t> variable (= 1 if tract </a:t>
+            </a:r>
+            <a:r>
+              <a:rPr lang="fr-FR" sz="800" dirty="0" err="1"/>
+              <a:t>bounds</a:t>
+            </a:r>
+            <a:r>
+              <a:rPr lang="fr-FR" sz="800" dirty="0"/>
+              <a:t> river; 0 </a:t>
+            </a:r>
+            <a:r>
+              <a:rPr lang="fr-FR" sz="800" dirty="0" err="1"/>
+              <a:t>otherwise</a:t>
+            </a:r>
+            <a:r>
+              <a:rPr lang="fr-FR" sz="800" dirty="0"/>
+              <a:t>)",</a:t>
+            </a:r>
+          </a:p>
+          <a:p>
+            <a:r>
+              <a:rPr lang="fr-FR" sz="800" dirty="0"/>
+              <a:t>    "NOX"      : "</a:t>
+            </a:r>
+            <a:r>
+              <a:rPr lang="fr-FR" sz="800" dirty="0" err="1"/>
+              <a:t>nitric</a:t>
+            </a:r>
+            <a:r>
+              <a:rPr lang="fr-FR" sz="800" dirty="0"/>
+              <a:t> </a:t>
+            </a:r>
+            <a:r>
+              <a:rPr lang="fr-FR" sz="800" dirty="0" err="1"/>
+              <a:t>oxides</a:t>
+            </a:r>
+            <a:r>
+              <a:rPr lang="fr-FR" sz="800" dirty="0"/>
+              <a:t> concentration (parts per 10 million)",</a:t>
+            </a:r>
+          </a:p>
+          <a:p>
+            <a:r>
+              <a:rPr lang="fr-FR" sz="800" dirty="0"/>
+              <a:t>    "RM"       : "</a:t>
+            </a:r>
+            <a:r>
+              <a:rPr lang="fr-FR" sz="800" dirty="0" err="1"/>
+              <a:t>average</a:t>
+            </a:r>
+            <a:r>
+              <a:rPr lang="fr-FR" sz="800" dirty="0"/>
+              <a:t> </a:t>
+            </a:r>
+            <a:r>
+              <a:rPr lang="fr-FR" sz="800" dirty="0" err="1"/>
+              <a:t>number</a:t>
+            </a:r>
+            <a:r>
+              <a:rPr lang="fr-FR" sz="800" dirty="0"/>
+              <a:t> of </a:t>
+            </a:r>
+            <a:r>
+              <a:rPr lang="fr-FR" sz="800" dirty="0" err="1"/>
+              <a:t>rooms</a:t>
+            </a:r>
+            <a:r>
+              <a:rPr lang="fr-FR" sz="800" dirty="0"/>
+              <a:t> per </a:t>
+            </a:r>
+            <a:r>
+              <a:rPr lang="fr-FR" sz="800" dirty="0" err="1"/>
+              <a:t>dwelling</a:t>
+            </a:r>
+            <a:r>
+              <a:rPr lang="fr-FR" sz="800" dirty="0"/>
+              <a:t>",</a:t>
+            </a:r>
+          </a:p>
+          <a:p>
+            <a:r>
+              <a:rPr lang="fr-FR" sz="800" dirty="0"/>
+              <a:t>    "AGE"      : "proportion of </a:t>
+            </a:r>
+            <a:r>
+              <a:rPr lang="fr-FR" sz="800" dirty="0" err="1"/>
+              <a:t>owner-occupied</a:t>
+            </a:r>
+            <a:r>
+              <a:rPr lang="fr-FR" sz="800" dirty="0"/>
+              <a:t> </a:t>
+            </a:r>
+            <a:r>
+              <a:rPr lang="fr-FR" sz="800" dirty="0" err="1"/>
+              <a:t>units</a:t>
+            </a:r>
+            <a:r>
+              <a:rPr lang="fr-FR" sz="800" dirty="0"/>
+              <a:t> </a:t>
+            </a:r>
+            <a:r>
+              <a:rPr lang="fr-FR" sz="800" dirty="0" err="1"/>
+              <a:t>built</a:t>
+            </a:r>
+            <a:r>
+              <a:rPr lang="fr-FR" sz="800" dirty="0"/>
+              <a:t> </a:t>
+            </a:r>
+            <a:r>
+              <a:rPr lang="fr-FR" sz="800" dirty="0" err="1"/>
+              <a:t>prior</a:t>
+            </a:r>
+            <a:r>
+              <a:rPr lang="fr-FR" sz="800" dirty="0"/>
+              <a:t> to 1940",</a:t>
+            </a:r>
+          </a:p>
+          <a:p>
+            <a:r>
+              <a:rPr lang="fr-FR" sz="800" dirty="0"/>
+              <a:t>    "DIS"      : "</a:t>
+            </a:r>
+            <a:r>
+              <a:rPr lang="fr-FR" sz="800" dirty="0" err="1"/>
+              <a:t>weighted</a:t>
+            </a:r>
+            <a:r>
+              <a:rPr lang="fr-FR" sz="800" dirty="0"/>
+              <a:t> distances to five Boston </a:t>
+            </a:r>
+            <a:r>
+              <a:rPr lang="fr-FR" sz="800" dirty="0" err="1"/>
+              <a:t>employment</a:t>
+            </a:r>
+            <a:r>
+              <a:rPr lang="fr-FR" sz="800" dirty="0"/>
+              <a:t> centres",</a:t>
+            </a:r>
+          </a:p>
+          <a:p>
+            <a:r>
+              <a:rPr lang="fr-FR" sz="800" dirty="0"/>
+              <a:t>    "RAD"      : "index of </a:t>
+            </a:r>
+            <a:r>
+              <a:rPr lang="fr-FR" sz="800" dirty="0" err="1"/>
+              <a:t>accessibility</a:t>
+            </a:r>
+            <a:r>
+              <a:rPr lang="fr-FR" sz="800" dirty="0"/>
+              <a:t> to radial </a:t>
+            </a:r>
+            <a:r>
+              <a:rPr lang="fr-FR" sz="800" dirty="0" err="1"/>
+              <a:t>highways</a:t>
+            </a:r>
+            <a:r>
+              <a:rPr lang="fr-FR" sz="800" dirty="0"/>
+              <a:t>",</a:t>
+            </a:r>
+          </a:p>
+          <a:p>
+            <a:r>
+              <a:rPr lang="fr-FR" sz="800" dirty="0"/>
+              <a:t>    "TAX"      : "full-value </a:t>
+            </a:r>
+            <a:r>
+              <a:rPr lang="fr-FR" sz="800" dirty="0" err="1"/>
+              <a:t>property-tax</a:t>
+            </a:r>
+            <a:r>
+              <a:rPr lang="fr-FR" sz="800" dirty="0"/>
+              <a:t> rate per $10,000",</a:t>
+            </a:r>
+          </a:p>
+          <a:p>
+            <a:r>
+              <a:rPr lang="fr-FR" sz="800" dirty="0"/>
+              <a:t>    "PTRATIO"  : "</a:t>
+            </a:r>
+            <a:r>
+              <a:rPr lang="fr-FR" sz="800" dirty="0" err="1"/>
+              <a:t>pupil-teacher</a:t>
+            </a:r>
+            <a:r>
+              <a:rPr lang="fr-FR" sz="800" dirty="0"/>
+              <a:t> ratio by </a:t>
+            </a:r>
+            <a:r>
+              <a:rPr lang="fr-FR" sz="800" dirty="0" err="1"/>
+              <a:t>town</a:t>
+            </a:r>
+            <a:r>
+              <a:rPr lang="fr-FR" sz="800" dirty="0"/>
+              <a:t>",</a:t>
+            </a:r>
+          </a:p>
+          <a:p>
+            <a:r>
+              <a:rPr lang="fr-FR" sz="800" dirty="0"/>
+              <a:t>    "B"        : "1000(</a:t>
+            </a:r>
+            <a:r>
+              <a:rPr lang="fr-FR" sz="800" dirty="0" err="1"/>
+              <a:t>Bk</a:t>
+            </a:r>
+            <a:r>
+              <a:rPr lang="fr-FR" sz="800" dirty="0"/>
+              <a:t> - 0.63)^2 </a:t>
+            </a:r>
+            <a:r>
+              <a:rPr lang="fr-FR" sz="800" dirty="0" err="1"/>
+              <a:t>where</a:t>
+            </a:r>
+            <a:r>
+              <a:rPr lang="fr-FR" sz="800" dirty="0"/>
+              <a:t> </a:t>
+            </a:r>
+            <a:r>
+              <a:rPr lang="fr-FR" sz="800" dirty="0" err="1"/>
+              <a:t>Bk</a:t>
+            </a:r>
+            <a:r>
+              <a:rPr lang="fr-FR" sz="800" dirty="0"/>
+              <a:t> </a:t>
+            </a:r>
+            <a:r>
+              <a:rPr lang="fr-FR" sz="800" dirty="0" err="1"/>
+              <a:t>is</a:t>
+            </a:r>
+            <a:r>
+              <a:rPr lang="fr-FR" sz="800" dirty="0"/>
+              <a:t> the proportion of blacks by </a:t>
+            </a:r>
+            <a:r>
+              <a:rPr lang="fr-FR" sz="800" dirty="0" err="1"/>
+              <a:t>town</a:t>
+            </a:r>
+            <a:r>
+              <a:rPr lang="fr-FR" sz="800" dirty="0"/>
+              <a:t>",</a:t>
+            </a:r>
+          </a:p>
+          <a:p>
+            <a:r>
+              <a:rPr lang="fr-FR" sz="800" dirty="0"/>
+              <a:t>    "LSTAT"    : "% </a:t>
+            </a:r>
+            <a:r>
+              <a:rPr lang="fr-FR" sz="800" dirty="0" err="1"/>
+              <a:t>lower</a:t>
+            </a:r>
+            <a:r>
+              <a:rPr lang="fr-FR" sz="800" dirty="0"/>
+              <a:t> </a:t>
+            </a:r>
+            <a:r>
+              <a:rPr lang="fr-FR" sz="800" dirty="0" err="1"/>
+              <a:t>status</a:t>
+            </a:r>
+            <a:r>
+              <a:rPr lang="fr-FR" sz="800" dirty="0"/>
+              <a:t> of the population",</a:t>
+            </a:r>
+          </a:p>
+          <a:p>
+            <a:r>
+              <a:rPr lang="fr-FR" sz="800" dirty="0"/>
+              <a:t>    "MEDV"     : "</a:t>
+            </a:r>
+            <a:r>
+              <a:rPr lang="fr-FR" sz="800" dirty="0" err="1"/>
+              <a:t>Median</a:t>
+            </a:r>
+            <a:r>
+              <a:rPr lang="fr-FR" sz="800" dirty="0"/>
+              <a:t> value of </a:t>
+            </a:r>
+            <a:r>
+              <a:rPr lang="fr-FR" sz="800" dirty="0" err="1"/>
+              <a:t>owner-occupied</a:t>
+            </a:r>
+            <a:r>
+              <a:rPr lang="fr-FR" sz="800" dirty="0"/>
+              <a:t> homes in $1000's"}</a:t>
+            </a:r>
+          </a:p>
+        </p:txBody>
+      </p:sp>
+      <p:sp>
+        <p:nvSpPr>
+          <p:cNvPr id="6" name="Flèche vers le bas 5">
+            <a:extLst>
+              <a:ext uri="{FF2B5EF4-FFF2-40B4-BE49-F238E27FC236}">
+                <a16:creationId xmlns:a16="http://schemas.microsoft.com/office/drawing/2014/main" id="{B3FF12AB-1D04-FF48-AC13-69A1677F34B7}"/>
+              </a:ext>
+            </a:extLst>
+          </p:cNvPr>
+          <p:cNvSpPr/>
+          <p:nvPr/>
+        </p:nvSpPr>
+        <p:spPr>
+          <a:xfrm rot="10800000">
+            <a:off x="9466729" y="2786231"/>
+            <a:ext cx="666975" cy="1011218"/>
+          </a:xfrm>
+          <a:prstGeom prst="downArrow">
+            <a:avLst/>
+          </a:prstGeom>
+        </p:spPr>
+        <p:style>
+          <a:lnRef idx="2">
+            <a:schemeClr val="accent1">
+              <a:shade val="50000"/>
+            </a:schemeClr>
+          </a:lnRef>
+          <a:fillRef idx="1">
+            <a:schemeClr val="accent1"/>
+          </a:fillRef>
+          <a:effectRef idx="0">
+            <a:schemeClr val="accent1"/>
+          </a:effectRef>
+          <a:fontRef idx="minor">
+            <a:schemeClr val="lt1"/>
+          </a:fontRef>
+        </p:style>
+        <p:txBody>
+          <a:bodyPr rtlCol="0" anchor="ctr"/>
+          <a:lstStyle/>
+          <a:p>
+            <a:pPr algn="ctr"/>
+            <a:endParaRPr lang="fr-FR"/>
+          </a:p>
+        </p:txBody>
+      </p:sp>
+      <p:sp>
+        <p:nvSpPr>
+          <p:cNvPr id="7" name="ZoneTexte 6">
+            <a:extLst>
+              <a:ext uri="{FF2B5EF4-FFF2-40B4-BE49-F238E27FC236}">
+                <a16:creationId xmlns:a16="http://schemas.microsoft.com/office/drawing/2014/main" id="{AADF20D3-047C-8144-A532-CC905698D751}"/>
+              </a:ext>
+            </a:extLst>
+          </p:cNvPr>
+          <p:cNvSpPr txBox="1"/>
+          <p:nvPr/>
+        </p:nvSpPr>
+        <p:spPr>
+          <a:xfrm>
+            <a:off x="8444753" y="4077148"/>
+            <a:ext cx="2574166" cy="369332"/>
+          </a:xfrm>
+          <a:prstGeom prst="rect">
+            <a:avLst/>
+          </a:prstGeom>
+          <a:noFill/>
+        </p:spPr>
+        <p:txBody>
+          <a:bodyPr wrap="none" rtlCol="0">
+            <a:spAutoFit/>
+          </a:bodyPr>
+          <a:lstStyle/>
+          <a:p>
+            <a:r>
+              <a:rPr lang="fr-FR" dirty="0"/>
+              <a:t>Texte copiable (j’espère..)</a:t>
+            </a:r>
+          </a:p>
+        </p:txBody>
+      </p:sp>
+    </p:spTree>
+    <p:extLst>
+      <p:ext uri="{BB962C8B-B14F-4D97-AF65-F5344CB8AC3E}">
+        <p14:creationId xmlns:p14="http://schemas.microsoft.com/office/powerpoint/2010/main" val="2546779903"/>
+      </p:ext>
+    </p:extLst>
+  </p:cSld>
+  <p:clrMapOvr>
+    <a:masterClrMapping/>
+  </p:clrMapOvr>
+</p:sld>
+</file>
+
 <file path=ppt/theme/theme1.xml><?xml version="1.0" encoding="utf-8"?>
 <a:theme xmlns:a="http://schemas.openxmlformats.org/drawingml/2006/main" name="Thème Office">
   <a:themeElements>

</xml_diff>